<commit_message>
Updated talks for 2016 Basics Workshop
</commit_message>
<xml_diff>
--- a/Basics_Supercomputing/beginner_parallel_computing.pptx
+++ b/Basics_Supercomputing/beginner_parallel_computing.pptx
@@ -239,7 +239,7 @@
           <a:p>
             <a:fld id="{F8E3E0DE-FB6D-A44C-A23A-E2BCA235FD7A}" type="datetimeFigureOut">
               <a:rPr lang="en-US" smtClean="0"/>
-              <a:t>7/12/16</a:t>
+              <a:t>7/16/16</a:t>
             </a:fld>
             <a:endParaRPr lang="en-US"/>
           </a:p>
@@ -405,7 +405,7 @@
           <a:p>
             <a:fld id="{60A63853-5987-DF4B-9DFB-1B52DF4CD897}" type="datetimeFigureOut">
               <a:rPr lang="en-US" smtClean="0"/>
-              <a:t>7/12/16</a:t>
+              <a:t>7/16/16</a:t>
             </a:fld>
             <a:endParaRPr lang="en-US"/>
           </a:p>
@@ -2615,7 +2615,7 @@
           <a:p>
             <a:fld id="{DF497170-C86C-3649-BDE1-33A3EDC5AF66}" type="datetime1">
               <a:rPr lang="en-US" smtClean="0"/>
-              <a:t>7/12/16</a:t>
+              <a:t>7/16/16</a:t>
             </a:fld>
             <a:endParaRPr lang="en-US"/>
           </a:p>
@@ -2790,7 +2790,7 @@
           <a:p>
             <a:fld id="{3B6066F8-7A7F-274A-A168-C58F13C390CD}" type="datetime1">
               <a:rPr lang="en-US" smtClean="0"/>
-              <a:t>7/12/16</a:t>
+              <a:t>7/16/16</a:t>
             </a:fld>
             <a:endParaRPr lang="en-US"/>
           </a:p>
@@ -2974,7 +2974,7 @@
           <a:p>
             <a:fld id="{9BA87E43-309A-534A-B342-CDBE4636DF37}" type="datetime1">
               <a:rPr lang="en-US" smtClean="0"/>
-              <a:t>7/12/16</a:t>
+              <a:t>7/16/16</a:t>
             </a:fld>
             <a:endParaRPr lang="en-US"/>
           </a:p>
@@ -3220,7 +3220,7 @@
           <a:p>
             <a:fld id="{F7215EB1-6E98-0547-99BF-D0027BB4EBAB}" type="datetime1">
               <a:rPr lang="en-US" smtClean="0"/>
-              <a:t>7/12/16</a:t>
+              <a:t>7/16/16</a:t>
             </a:fld>
             <a:endParaRPr lang="en-US"/>
           </a:p>
@@ -3394,7 +3394,7 @@
           <a:p>
             <a:fld id="{7716A4F4-627E-F947-BAC7-27B376CE86CF}" type="datetime1">
               <a:rPr lang="en-US" smtClean="0"/>
-              <a:t>7/12/16</a:t>
+              <a:t>7/16/16</a:t>
             </a:fld>
             <a:endParaRPr lang="en-US"/>
           </a:p>
@@ -3644,7 +3644,7 @@
           <a:p>
             <a:fld id="{05700CA5-D989-984A-9E75-0EF01E16DE6C}" type="datetime1">
               <a:rPr lang="en-US" smtClean="0"/>
-              <a:t>7/12/16</a:t>
+              <a:t>7/16/16</a:t>
             </a:fld>
             <a:endParaRPr lang="en-US"/>
           </a:p>
@@ -3936,7 +3936,7 @@
           <a:p>
             <a:fld id="{8D9C5303-0D69-BE4E-BAFF-6CC72824CDDB}" type="datetime1">
               <a:rPr lang="en-US" smtClean="0"/>
-              <a:t>7/12/16</a:t>
+              <a:t>7/16/16</a:t>
             </a:fld>
             <a:endParaRPr lang="en-US"/>
           </a:p>
@@ -4362,7 +4362,7 @@
           <a:p>
             <a:fld id="{4CFECF41-D59B-E84A-BCC9-02E58775B87F}" type="datetime1">
               <a:rPr lang="en-US" smtClean="0"/>
-              <a:t>7/12/16</a:t>
+              <a:t>7/16/16</a:t>
             </a:fld>
             <a:endParaRPr lang="en-US"/>
           </a:p>
@@ -4484,7 +4484,7 @@
           <a:p>
             <a:fld id="{55FAEA16-07AF-D54C-A97B-028517976A78}" type="datetime1">
               <a:rPr lang="en-US" smtClean="0"/>
-              <a:t>7/12/16</a:t>
+              <a:t>7/16/16</a:t>
             </a:fld>
             <a:endParaRPr lang="en-US"/>
           </a:p>
@@ -4583,7 +4583,7 @@
           <a:p>
             <a:fld id="{B0BBDEF5-1D4D-CD46-88A1-6785361D7579}" type="datetime1">
               <a:rPr lang="en-US" smtClean="0"/>
-              <a:t>7/12/16</a:t>
+              <a:t>7/16/16</a:t>
             </a:fld>
             <a:endParaRPr lang="en-US"/>
           </a:p>
@@ -4864,7 +4864,7 @@
           <a:p>
             <a:fld id="{F0D0BB3B-26F2-4940-BB87-97BD157EDCF4}" type="datetime1">
               <a:rPr lang="en-US" smtClean="0"/>
-              <a:t>7/12/16</a:t>
+              <a:t>7/16/16</a:t>
             </a:fld>
             <a:endParaRPr lang="en-US"/>
           </a:p>
@@ -5038,7 +5038,7 @@
           <a:p>
             <a:fld id="{D3D04FFA-4763-3940-BDBB-7F18909534D6}" type="datetime1">
               <a:rPr lang="en-US" smtClean="0"/>
-              <a:t>7/12/16</a:t>
+              <a:t>7/16/16</a:t>
             </a:fld>
             <a:endParaRPr lang="en-US"/>
           </a:p>
@@ -5299,7 +5299,7 @@
           <a:p>
             <a:fld id="{D38A34DE-C38D-1A44-B9BF-05976128C428}" type="datetime1">
               <a:rPr lang="en-US" smtClean="0"/>
-              <a:t>7/12/16</a:t>
+              <a:t>7/16/16</a:t>
             </a:fld>
             <a:endParaRPr lang="en-US"/>
           </a:p>
@@ -5473,7 +5473,7 @@
           <a:p>
             <a:fld id="{13440077-B841-C145-9C18-2283712C6CB4}" type="datetime1">
               <a:rPr lang="en-US" smtClean="0"/>
-              <a:t>7/12/16</a:t>
+              <a:t>7/16/16</a:t>
             </a:fld>
             <a:endParaRPr lang="en-US"/>
           </a:p>
@@ -5657,7 +5657,7 @@
           <a:p>
             <a:fld id="{F723A81D-F8EC-CE48-9C59-6C88B5ABB1EE}" type="datetime1">
               <a:rPr lang="en-US" smtClean="0"/>
-              <a:t>7/12/16</a:t>
+              <a:t>7/16/16</a:t>
             </a:fld>
             <a:endParaRPr lang="en-US"/>
           </a:p>
@@ -5903,7 +5903,7 @@
           <a:p>
             <a:fld id="{E0E97AC1-AEB6-9A41-BDD0-DAA9B6767518}" type="datetime1">
               <a:rPr lang="en-US" smtClean="0"/>
-              <a:t>7/12/16</a:t>
+              <a:t>7/16/16</a:t>
             </a:fld>
             <a:endParaRPr lang="en-US"/>
           </a:p>
@@ -6077,7 +6077,7 @@
           <a:p>
             <a:fld id="{BBBAA815-03A6-0A4E-87FD-E86A8A9A40D3}" type="datetime1">
               <a:rPr lang="en-US" smtClean="0"/>
-              <a:t>7/12/16</a:t>
+              <a:t>7/16/16</a:t>
             </a:fld>
             <a:endParaRPr lang="en-US"/>
           </a:p>
@@ -6327,7 +6327,7 @@
           <a:p>
             <a:fld id="{616C3B44-5A0D-2F46-8081-2CFA459EEA7C}" type="datetime1">
               <a:rPr lang="en-US" smtClean="0"/>
-              <a:t>7/12/16</a:t>
+              <a:t>7/16/16</a:t>
             </a:fld>
             <a:endParaRPr lang="en-US"/>
           </a:p>
@@ -6619,7 +6619,7 @@
           <a:p>
             <a:fld id="{A641A974-C8F0-FD4D-806A-5E395EA7ABF6}" type="datetime1">
               <a:rPr lang="en-US" smtClean="0"/>
-              <a:t>7/12/16</a:t>
+              <a:t>7/16/16</a:t>
             </a:fld>
             <a:endParaRPr lang="en-US"/>
           </a:p>
@@ -7045,7 +7045,7 @@
           <a:p>
             <a:fld id="{A1D16938-FA12-F64E-BCBB-389968695F02}" type="datetime1">
               <a:rPr lang="en-US" smtClean="0"/>
-              <a:t>7/12/16</a:t>
+              <a:t>7/16/16</a:t>
             </a:fld>
             <a:endParaRPr lang="en-US"/>
           </a:p>
@@ -7167,7 +7167,7 @@
           <a:p>
             <a:fld id="{CF63F13C-3CFF-D244-B5CD-47A2BF807C32}" type="datetime1">
               <a:rPr lang="en-US" smtClean="0"/>
-              <a:t>7/12/16</a:t>
+              <a:t>7/16/16</a:t>
             </a:fld>
             <a:endParaRPr lang="en-US"/>
           </a:p>
@@ -7266,7 +7266,7 @@
           <a:p>
             <a:fld id="{A0363029-698C-0248-BC99-62FB129A753A}" type="datetime1">
               <a:rPr lang="en-US" smtClean="0"/>
-              <a:t>7/12/16</a:t>
+              <a:t>7/16/16</a:t>
             </a:fld>
             <a:endParaRPr lang="en-US"/>
           </a:p>
@@ -7516,7 +7516,7 @@
           <a:p>
             <a:fld id="{00A57354-8057-5441-A1FC-1462260F7946}" type="datetime1">
               <a:rPr lang="en-US" smtClean="0"/>
-              <a:t>7/12/16</a:t>
+              <a:t>7/16/16</a:t>
             </a:fld>
             <a:endParaRPr lang="en-US"/>
           </a:p>
@@ -7797,7 +7797,7 @@
           <a:p>
             <a:fld id="{912B8968-7AA7-5241-BCA5-4F086041F83F}" type="datetime1">
               <a:rPr lang="en-US" smtClean="0"/>
-              <a:t>7/12/16</a:t>
+              <a:t>7/16/16</a:t>
             </a:fld>
             <a:endParaRPr lang="en-US"/>
           </a:p>
@@ -8058,7 +8058,7 @@
           <a:p>
             <a:fld id="{D4365BFF-E7C2-8743-A7E7-2D2559B97269}" type="datetime1">
               <a:rPr lang="en-US" smtClean="0"/>
-              <a:t>7/12/16</a:t>
+              <a:t>7/16/16</a:t>
             </a:fld>
             <a:endParaRPr lang="en-US"/>
           </a:p>
@@ -8232,7 +8232,7 @@
           <a:p>
             <a:fld id="{04E88BF2-6E25-B443-B461-3B792E9FA655}" type="datetime1">
               <a:rPr lang="en-US" smtClean="0"/>
-              <a:t>7/12/16</a:t>
+              <a:t>7/16/16</a:t>
             </a:fld>
             <a:endParaRPr lang="en-US"/>
           </a:p>
@@ -8416,7 +8416,7 @@
           <a:p>
             <a:fld id="{CCB23090-B02D-DA45-B0AE-3F004241AA66}" type="datetime1">
               <a:rPr lang="en-US" smtClean="0"/>
-              <a:t>7/12/16</a:t>
+              <a:t>7/16/16</a:t>
             </a:fld>
             <a:endParaRPr lang="en-US"/>
           </a:p>
@@ -8675,7 +8675,7 @@
           <a:p>
             <a:fld id="{3ED562F9-8CF3-C64E-A6C7-4A9516DE74A4}" type="datetime1">
               <a:rPr lang="en-US" smtClean="0"/>
-              <a:t>7/12/16</a:t>
+              <a:t>7/16/16</a:t>
             </a:fld>
             <a:endParaRPr lang="en-US" dirty="0"/>
           </a:p>
@@ -8865,7 +8865,7 @@
           <a:p>
             <a:fld id="{CD1E1A55-4567-5344-AFE7-53A24335CB90}" type="datetime1">
               <a:rPr lang="en-US" smtClean="0"/>
-              <a:t>7/12/16</a:t>
+              <a:t>7/16/16</a:t>
             </a:fld>
             <a:endParaRPr lang="en-US" dirty="0"/>
           </a:p>
@@ -9131,7 +9131,7 @@
           <a:p>
             <a:fld id="{E8642CD2-B4A4-514B-9679-D84510193A8C}" type="datetime1">
               <a:rPr lang="en-US" smtClean="0"/>
-              <a:t>7/12/16</a:t>
+              <a:t>7/16/16</a:t>
             </a:fld>
             <a:endParaRPr lang="en-US" dirty="0"/>
           </a:p>
@@ -9439,7 +9439,7 @@
           <a:p>
             <a:fld id="{9BC15B16-9C0F-6845-BED0-00A6C9678626}" type="datetime1">
               <a:rPr lang="en-US" smtClean="0"/>
-              <a:t>7/12/16</a:t>
+              <a:t>7/16/16</a:t>
             </a:fld>
             <a:endParaRPr lang="en-US" dirty="0"/>
           </a:p>
@@ -9893,7 +9893,7 @@
           <a:p>
             <a:fld id="{FCA5B900-982B-9B46-B2DD-6BAACBEC0B1C}" type="datetime1">
               <a:rPr lang="en-US" smtClean="0"/>
-              <a:t>7/12/16</a:t>
+              <a:t>7/16/16</a:t>
             </a:fld>
             <a:endParaRPr lang="en-US" dirty="0"/>
           </a:p>
@@ -10031,7 +10031,7 @@
           <a:p>
             <a:fld id="{50F3C284-298F-C741-A57D-0B2637C22505}" type="datetime1">
               <a:rPr lang="en-US" smtClean="0"/>
-              <a:t>7/12/16</a:t>
+              <a:t>7/16/16</a:t>
             </a:fld>
             <a:endParaRPr lang="en-US" dirty="0"/>
           </a:p>
@@ -10339,7 +10339,7 @@
           <a:p>
             <a:fld id="{B0C93416-1E67-7849-A7E9-22356A0E6F30}" type="datetime1">
               <a:rPr lang="en-US" smtClean="0"/>
-              <a:t>7/12/16</a:t>
+              <a:t>7/16/16</a:t>
             </a:fld>
             <a:endParaRPr lang="en-US"/>
           </a:p>
@@ -10438,7 +10438,7 @@
           <a:p>
             <a:fld id="{09E08876-CC87-7D41-96C2-22D13143719E}" type="datetime1">
               <a:rPr lang="en-US" smtClean="0"/>
-              <a:t>7/12/16</a:t>
+              <a:t>7/16/16</a:t>
             </a:fld>
             <a:endParaRPr lang="en-US" dirty="0"/>
           </a:p>
@@ -10652,7 +10652,7 @@
           <a:p>
             <a:fld id="{002910D2-8592-D246-84D8-4F0DFE6AF989}" type="datetime1">
               <a:rPr lang="en-US" smtClean="0"/>
-              <a:t>7/12/16</a:t>
+              <a:t>7/16/16</a:t>
             </a:fld>
             <a:endParaRPr lang="en-US" dirty="0"/>
           </a:p>
@@ -10995,7 +10995,7 @@
           <a:p>
             <a:fld id="{55C13C92-F12E-A645-9195-72D828A1E4CC}" type="datetime1">
               <a:rPr lang="en-US" smtClean="0"/>
-              <a:t>7/12/16</a:t>
+              <a:t>7/16/16</a:t>
             </a:fld>
             <a:endParaRPr lang="en-US" dirty="0"/>
           </a:p>
@@ -11185,7 +11185,7 @@
           <a:p>
             <a:fld id="{9ABECC1E-BB2D-8640-BFAA-F2649732F171}" type="datetime1">
               <a:rPr lang="en-US" smtClean="0"/>
-              <a:t>7/12/16</a:t>
+              <a:t>7/16/16</a:t>
             </a:fld>
             <a:endParaRPr lang="en-US" dirty="0"/>
           </a:p>
@@ -11385,7 +11385,7 @@
           <a:p>
             <a:fld id="{1F68B04B-D1A6-6E47-8FFF-8EA857FCC20A}" type="datetime1">
               <a:rPr lang="en-US" smtClean="0"/>
-              <a:t>7/12/16</a:t>
+              <a:t>7/16/16</a:t>
             </a:fld>
             <a:endParaRPr lang="en-US" dirty="0"/>
           </a:p>
@@ -12029,7 +12029,7 @@
           <a:p>
             <a:fld id="{1E48077B-6B03-7F42-9161-87D0FE7973F8}" type="datetime1">
               <a:rPr lang="en-US" smtClean="0"/>
-              <a:t>7/12/16</a:t>
+              <a:t>7/16/16</a:t>
             </a:fld>
             <a:endParaRPr lang="en-US"/>
           </a:p>
@@ -12151,7 +12151,7 @@
           <a:p>
             <a:fld id="{0136884D-1469-1E46-9263-BB8D1ACB4A64}" type="datetime1">
               <a:rPr lang="en-US" smtClean="0"/>
-              <a:t>7/12/16</a:t>
+              <a:t>7/16/16</a:t>
             </a:fld>
             <a:endParaRPr lang="en-US"/>
           </a:p>
@@ -12250,7 +12250,7 @@
           <a:p>
             <a:fld id="{27CC7E83-50E1-1045-83FA-0FAB594D1BD4}" type="datetime1">
               <a:rPr lang="en-US" smtClean="0"/>
-              <a:t>7/12/16</a:t>
+              <a:t>7/16/16</a:t>
             </a:fld>
             <a:endParaRPr lang="en-US"/>
           </a:p>
@@ -12531,7 +12531,7 @@
           <a:p>
             <a:fld id="{9C2E28BB-0C81-5F41-96D6-475C0F33378C}" type="datetime1">
               <a:rPr lang="en-US" smtClean="0"/>
-              <a:t>7/12/16</a:t>
+              <a:t>7/16/16</a:t>
             </a:fld>
             <a:endParaRPr lang="en-US"/>
           </a:p>
@@ -12793,7 +12793,7 @@
           <a:p>
             <a:fld id="{5A53C08C-A000-C24C-B0D4-14F9DA784B8F}" type="datetime1">
               <a:rPr lang="en-US" smtClean="0"/>
-              <a:t>7/12/16</a:t>
+              <a:t>7/16/16</a:t>
             </a:fld>
             <a:endParaRPr lang="en-US"/>
           </a:p>
@@ -13010,7 +13010,7 @@
           <a:p>
             <a:fld id="{12340213-C7C4-C342-8E00-73B99A2E5FF4}" type="datetime1">
               <a:rPr lang="en-US" smtClean="0"/>
-              <a:t>7/12/16</a:t>
+              <a:t>7/16/16</a:t>
             </a:fld>
             <a:endParaRPr lang="en-US"/>
           </a:p>
@@ -13525,7 +13525,7 @@
           <a:p>
             <a:fld id="{DA977EA7-3A8C-C341-8841-47FEC12237B0}" type="datetime1">
               <a:rPr lang="en-US" smtClean="0"/>
-              <a:t>7/12/16</a:t>
+              <a:t>7/16/16</a:t>
             </a:fld>
             <a:endParaRPr lang="en-US"/>
           </a:p>
@@ -14040,7 +14040,7 @@
           <a:p>
             <a:fld id="{C74D0869-9881-ED44-A01F-63192205CAAE}" type="datetime1">
               <a:rPr lang="en-US" smtClean="0"/>
-              <a:t>7/12/16</a:t>
+              <a:t>7/16/16</a:t>
             </a:fld>
             <a:endParaRPr lang="en-US"/>
           </a:p>
@@ -14685,7 +14685,7 @@
           <a:p>
             <a:fld id="{6FE751DF-67BA-6F4C-8258-CF63A9C81540}" type="datetime1">
               <a:rPr lang="en-US" smtClean="0"/>
-              <a:t>7/12/16</a:t>
+              <a:t>7/16/16</a:t>
             </a:fld>
             <a:endParaRPr lang="en-US"/>
           </a:p>
@@ -15140,7 +15140,11 @@
           <a:p>
             <a:r>
               <a:rPr lang="en-US" dirty="0" smtClean="0"/>
-              <a:t>Beginner Parallel Computing</a:t>
+              <a:t>What is this </a:t>
+            </a:r>
+            <a:r>
+              <a:rPr lang="en-US" smtClean="0"/>
+              <a:t>Parallel Computing Thing?</a:t>
             </a:r>
             <a:endParaRPr lang="en-US" dirty="0"/>
           </a:p>
@@ -21411,11 +21415,7 @@
             </a:r>
             <a:r>
               <a:rPr lang="en-US" smtClean="0"/>
-              <a:t>:  </a:t>
-            </a:r>
-            <a:r>
-              <a:rPr lang="en-US" smtClean="0"/>
-              <a:t>@CUBoulderRC</a:t>
+              <a:t>:  @CUBoulderRC</a:t>
             </a:r>
             <a:endParaRPr lang="en-US" dirty="0" smtClean="0"/>
           </a:p>
@@ -21486,7 +21486,7 @@
           <a:p>
             <a:fld id="{3A3C349A-9684-4D4B-9B48-BAC3E768F8DE}" type="datetime1">
               <a:rPr lang="en-US" smtClean="0"/>
-              <a:t>7/12/16</a:t>
+              <a:t>7/16/16</a:t>
             </a:fld>
             <a:endParaRPr lang="en-US" dirty="0"/>
           </a:p>

</xml_diff>

<commit_message>
Added scripts, updated talks
</commit_message>
<xml_diff>
--- a/Basics_Supercomputing/beginner_parallel_computing.pptx
+++ b/Basics_Supercomputing/beginner_parallel_computing.pptx
@@ -37,7 +37,7 @@
     <p:sldId id="300" r:id="rId25"/>
     <p:sldId id="299" r:id="rId26"/>
     <p:sldId id="301" r:id="rId27"/>
-    <p:sldId id="268" r:id="rId28"/>
+    <p:sldId id="316" r:id="rId28"/>
     <p:sldId id="287" r:id="rId29"/>
     <p:sldId id="315" r:id="rId30"/>
   </p:sldIdLst>
@@ -239,7 +239,7 @@
           <a:p>
             <a:fld id="{F8E3E0DE-FB6D-A44C-A23A-E2BCA235FD7A}" type="datetimeFigureOut">
               <a:rPr lang="en-US" smtClean="0"/>
-              <a:t>7/16/16</a:t>
+              <a:t>7/17/16</a:t>
             </a:fld>
             <a:endParaRPr lang="en-US"/>
           </a:p>
@@ -405,7 +405,7 @@
           <a:p>
             <a:fld id="{60A63853-5987-DF4B-9DFB-1B52DF4CD897}" type="datetimeFigureOut">
               <a:rPr lang="en-US" smtClean="0"/>
-              <a:t>7/16/16</a:t>
+              <a:t>7/17/16</a:t>
             </a:fld>
             <a:endParaRPr lang="en-US"/>
           </a:p>
@@ -2615,7 +2615,7 @@
           <a:p>
             <a:fld id="{DF497170-C86C-3649-BDE1-33A3EDC5AF66}" type="datetime1">
               <a:rPr lang="en-US" smtClean="0"/>
-              <a:t>7/16/16</a:t>
+              <a:t>7/17/16</a:t>
             </a:fld>
             <a:endParaRPr lang="en-US"/>
           </a:p>
@@ -2790,7 +2790,7 @@
           <a:p>
             <a:fld id="{3B6066F8-7A7F-274A-A168-C58F13C390CD}" type="datetime1">
               <a:rPr lang="en-US" smtClean="0"/>
-              <a:t>7/16/16</a:t>
+              <a:t>7/17/16</a:t>
             </a:fld>
             <a:endParaRPr lang="en-US"/>
           </a:p>
@@ -2974,7 +2974,7 @@
           <a:p>
             <a:fld id="{9BA87E43-309A-534A-B342-CDBE4636DF37}" type="datetime1">
               <a:rPr lang="en-US" smtClean="0"/>
-              <a:t>7/16/16</a:t>
+              <a:t>7/17/16</a:t>
             </a:fld>
             <a:endParaRPr lang="en-US"/>
           </a:p>
@@ -3220,7 +3220,7 @@
           <a:p>
             <a:fld id="{F7215EB1-6E98-0547-99BF-D0027BB4EBAB}" type="datetime1">
               <a:rPr lang="en-US" smtClean="0"/>
-              <a:t>7/16/16</a:t>
+              <a:t>7/17/16</a:t>
             </a:fld>
             <a:endParaRPr lang="en-US"/>
           </a:p>
@@ -3394,7 +3394,7 @@
           <a:p>
             <a:fld id="{7716A4F4-627E-F947-BAC7-27B376CE86CF}" type="datetime1">
               <a:rPr lang="en-US" smtClean="0"/>
-              <a:t>7/16/16</a:t>
+              <a:t>7/17/16</a:t>
             </a:fld>
             <a:endParaRPr lang="en-US"/>
           </a:p>
@@ -3644,7 +3644,7 @@
           <a:p>
             <a:fld id="{05700CA5-D989-984A-9E75-0EF01E16DE6C}" type="datetime1">
               <a:rPr lang="en-US" smtClean="0"/>
-              <a:t>7/16/16</a:t>
+              <a:t>7/17/16</a:t>
             </a:fld>
             <a:endParaRPr lang="en-US"/>
           </a:p>
@@ -3936,7 +3936,7 @@
           <a:p>
             <a:fld id="{8D9C5303-0D69-BE4E-BAFF-6CC72824CDDB}" type="datetime1">
               <a:rPr lang="en-US" smtClean="0"/>
-              <a:t>7/16/16</a:t>
+              <a:t>7/17/16</a:t>
             </a:fld>
             <a:endParaRPr lang="en-US"/>
           </a:p>
@@ -4362,7 +4362,7 @@
           <a:p>
             <a:fld id="{4CFECF41-D59B-E84A-BCC9-02E58775B87F}" type="datetime1">
               <a:rPr lang="en-US" smtClean="0"/>
-              <a:t>7/16/16</a:t>
+              <a:t>7/17/16</a:t>
             </a:fld>
             <a:endParaRPr lang="en-US"/>
           </a:p>
@@ -4484,7 +4484,7 @@
           <a:p>
             <a:fld id="{55FAEA16-07AF-D54C-A97B-028517976A78}" type="datetime1">
               <a:rPr lang="en-US" smtClean="0"/>
-              <a:t>7/16/16</a:t>
+              <a:t>7/17/16</a:t>
             </a:fld>
             <a:endParaRPr lang="en-US"/>
           </a:p>
@@ -4583,7 +4583,7 @@
           <a:p>
             <a:fld id="{B0BBDEF5-1D4D-CD46-88A1-6785361D7579}" type="datetime1">
               <a:rPr lang="en-US" smtClean="0"/>
-              <a:t>7/16/16</a:t>
+              <a:t>7/17/16</a:t>
             </a:fld>
             <a:endParaRPr lang="en-US"/>
           </a:p>
@@ -4864,7 +4864,7 @@
           <a:p>
             <a:fld id="{F0D0BB3B-26F2-4940-BB87-97BD157EDCF4}" type="datetime1">
               <a:rPr lang="en-US" smtClean="0"/>
-              <a:t>7/16/16</a:t>
+              <a:t>7/17/16</a:t>
             </a:fld>
             <a:endParaRPr lang="en-US"/>
           </a:p>
@@ -5038,7 +5038,7 @@
           <a:p>
             <a:fld id="{D3D04FFA-4763-3940-BDBB-7F18909534D6}" type="datetime1">
               <a:rPr lang="en-US" smtClean="0"/>
-              <a:t>7/16/16</a:t>
+              <a:t>7/17/16</a:t>
             </a:fld>
             <a:endParaRPr lang="en-US"/>
           </a:p>
@@ -5299,7 +5299,7 @@
           <a:p>
             <a:fld id="{D38A34DE-C38D-1A44-B9BF-05976128C428}" type="datetime1">
               <a:rPr lang="en-US" smtClean="0"/>
-              <a:t>7/16/16</a:t>
+              <a:t>7/17/16</a:t>
             </a:fld>
             <a:endParaRPr lang="en-US"/>
           </a:p>
@@ -5473,7 +5473,7 @@
           <a:p>
             <a:fld id="{13440077-B841-C145-9C18-2283712C6CB4}" type="datetime1">
               <a:rPr lang="en-US" smtClean="0"/>
-              <a:t>7/16/16</a:t>
+              <a:t>7/17/16</a:t>
             </a:fld>
             <a:endParaRPr lang="en-US"/>
           </a:p>
@@ -5657,7 +5657,7 @@
           <a:p>
             <a:fld id="{F723A81D-F8EC-CE48-9C59-6C88B5ABB1EE}" type="datetime1">
               <a:rPr lang="en-US" smtClean="0"/>
-              <a:t>7/16/16</a:t>
+              <a:t>7/17/16</a:t>
             </a:fld>
             <a:endParaRPr lang="en-US"/>
           </a:p>
@@ -5903,7 +5903,7 @@
           <a:p>
             <a:fld id="{E0E97AC1-AEB6-9A41-BDD0-DAA9B6767518}" type="datetime1">
               <a:rPr lang="en-US" smtClean="0"/>
-              <a:t>7/16/16</a:t>
+              <a:t>7/17/16</a:t>
             </a:fld>
             <a:endParaRPr lang="en-US"/>
           </a:p>
@@ -6077,7 +6077,7 @@
           <a:p>
             <a:fld id="{BBBAA815-03A6-0A4E-87FD-E86A8A9A40D3}" type="datetime1">
               <a:rPr lang="en-US" smtClean="0"/>
-              <a:t>7/16/16</a:t>
+              <a:t>7/17/16</a:t>
             </a:fld>
             <a:endParaRPr lang="en-US"/>
           </a:p>
@@ -6327,7 +6327,7 @@
           <a:p>
             <a:fld id="{616C3B44-5A0D-2F46-8081-2CFA459EEA7C}" type="datetime1">
               <a:rPr lang="en-US" smtClean="0"/>
-              <a:t>7/16/16</a:t>
+              <a:t>7/17/16</a:t>
             </a:fld>
             <a:endParaRPr lang="en-US"/>
           </a:p>
@@ -6619,7 +6619,7 @@
           <a:p>
             <a:fld id="{A641A974-C8F0-FD4D-806A-5E395EA7ABF6}" type="datetime1">
               <a:rPr lang="en-US" smtClean="0"/>
-              <a:t>7/16/16</a:t>
+              <a:t>7/17/16</a:t>
             </a:fld>
             <a:endParaRPr lang="en-US"/>
           </a:p>
@@ -7045,7 +7045,7 @@
           <a:p>
             <a:fld id="{A1D16938-FA12-F64E-BCBB-389968695F02}" type="datetime1">
               <a:rPr lang="en-US" smtClean="0"/>
-              <a:t>7/16/16</a:t>
+              <a:t>7/17/16</a:t>
             </a:fld>
             <a:endParaRPr lang="en-US"/>
           </a:p>
@@ -7167,7 +7167,7 @@
           <a:p>
             <a:fld id="{CF63F13C-3CFF-D244-B5CD-47A2BF807C32}" type="datetime1">
               <a:rPr lang="en-US" smtClean="0"/>
-              <a:t>7/16/16</a:t>
+              <a:t>7/17/16</a:t>
             </a:fld>
             <a:endParaRPr lang="en-US"/>
           </a:p>
@@ -7266,7 +7266,7 @@
           <a:p>
             <a:fld id="{A0363029-698C-0248-BC99-62FB129A753A}" type="datetime1">
               <a:rPr lang="en-US" smtClean="0"/>
-              <a:t>7/16/16</a:t>
+              <a:t>7/17/16</a:t>
             </a:fld>
             <a:endParaRPr lang="en-US"/>
           </a:p>
@@ -7516,7 +7516,7 @@
           <a:p>
             <a:fld id="{00A57354-8057-5441-A1FC-1462260F7946}" type="datetime1">
               <a:rPr lang="en-US" smtClean="0"/>
-              <a:t>7/16/16</a:t>
+              <a:t>7/17/16</a:t>
             </a:fld>
             <a:endParaRPr lang="en-US"/>
           </a:p>
@@ -7797,7 +7797,7 @@
           <a:p>
             <a:fld id="{912B8968-7AA7-5241-BCA5-4F086041F83F}" type="datetime1">
               <a:rPr lang="en-US" smtClean="0"/>
-              <a:t>7/16/16</a:t>
+              <a:t>7/17/16</a:t>
             </a:fld>
             <a:endParaRPr lang="en-US"/>
           </a:p>
@@ -8058,7 +8058,7 @@
           <a:p>
             <a:fld id="{D4365BFF-E7C2-8743-A7E7-2D2559B97269}" type="datetime1">
               <a:rPr lang="en-US" smtClean="0"/>
-              <a:t>7/16/16</a:t>
+              <a:t>7/17/16</a:t>
             </a:fld>
             <a:endParaRPr lang="en-US"/>
           </a:p>
@@ -8232,7 +8232,7 @@
           <a:p>
             <a:fld id="{04E88BF2-6E25-B443-B461-3B792E9FA655}" type="datetime1">
               <a:rPr lang="en-US" smtClean="0"/>
-              <a:t>7/16/16</a:t>
+              <a:t>7/17/16</a:t>
             </a:fld>
             <a:endParaRPr lang="en-US"/>
           </a:p>
@@ -8416,7 +8416,7 @@
           <a:p>
             <a:fld id="{CCB23090-B02D-DA45-B0AE-3F004241AA66}" type="datetime1">
               <a:rPr lang="en-US" smtClean="0"/>
-              <a:t>7/16/16</a:t>
+              <a:t>7/17/16</a:t>
             </a:fld>
             <a:endParaRPr lang="en-US"/>
           </a:p>
@@ -8675,7 +8675,7 @@
           <a:p>
             <a:fld id="{3ED562F9-8CF3-C64E-A6C7-4A9516DE74A4}" type="datetime1">
               <a:rPr lang="en-US" smtClean="0"/>
-              <a:t>7/16/16</a:t>
+              <a:t>7/17/16</a:t>
             </a:fld>
             <a:endParaRPr lang="en-US" dirty="0"/>
           </a:p>
@@ -8865,7 +8865,7 @@
           <a:p>
             <a:fld id="{CD1E1A55-4567-5344-AFE7-53A24335CB90}" type="datetime1">
               <a:rPr lang="en-US" smtClean="0"/>
-              <a:t>7/16/16</a:t>
+              <a:t>7/17/16</a:t>
             </a:fld>
             <a:endParaRPr lang="en-US" dirty="0"/>
           </a:p>
@@ -9131,7 +9131,7 @@
           <a:p>
             <a:fld id="{E8642CD2-B4A4-514B-9679-D84510193A8C}" type="datetime1">
               <a:rPr lang="en-US" smtClean="0"/>
-              <a:t>7/16/16</a:t>
+              <a:t>7/17/16</a:t>
             </a:fld>
             <a:endParaRPr lang="en-US" dirty="0"/>
           </a:p>
@@ -9439,7 +9439,7 @@
           <a:p>
             <a:fld id="{9BC15B16-9C0F-6845-BED0-00A6C9678626}" type="datetime1">
               <a:rPr lang="en-US" smtClean="0"/>
-              <a:t>7/16/16</a:t>
+              <a:t>7/17/16</a:t>
             </a:fld>
             <a:endParaRPr lang="en-US" dirty="0"/>
           </a:p>
@@ -9893,7 +9893,7 @@
           <a:p>
             <a:fld id="{FCA5B900-982B-9B46-B2DD-6BAACBEC0B1C}" type="datetime1">
               <a:rPr lang="en-US" smtClean="0"/>
-              <a:t>7/16/16</a:t>
+              <a:t>7/17/16</a:t>
             </a:fld>
             <a:endParaRPr lang="en-US" dirty="0"/>
           </a:p>
@@ -10031,7 +10031,7 @@
           <a:p>
             <a:fld id="{50F3C284-298F-C741-A57D-0B2637C22505}" type="datetime1">
               <a:rPr lang="en-US" smtClean="0"/>
-              <a:t>7/16/16</a:t>
+              <a:t>7/17/16</a:t>
             </a:fld>
             <a:endParaRPr lang="en-US" dirty="0"/>
           </a:p>
@@ -10339,7 +10339,7 @@
           <a:p>
             <a:fld id="{B0C93416-1E67-7849-A7E9-22356A0E6F30}" type="datetime1">
               <a:rPr lang="en-US" smtClean="0"/>
-              <a:t>7/16/16</a:t>
+              <a:t>7/17/16</a:t>
             </a:fld>
             <a:endParaRPr lang="en-US"/>
           </a:p>
@@ -10438,7 +10438,7 @@
           <a:p>
             <a:fld id="{09E08876-CC87-7D41-96C2-22D13143719E}" type="datetime1">
               <a:rPr lang="en-US" smtClean="0"/>
-              <a:t>7/16/16</a:t>
+              <a:t>7/17/16</a:t>
             </a:fld>
             <a:endParaRPr lang="en-US" dirty="0"/>
           </a:p>
@@ -10652,7 +10652,7 @@
           <a:p>
             <a:fld id="{002910D2-8592-D246-84D8-4F0DFE6AF989}" type="datetime1">
               <a:rPr lang="en-US" smtClean="0"/>
-              <a:t>7/16/16</a:t>
+              <a:t>7/17/16</a:t>
             </a:fld>
             <a:endParaRPr lang="en-US" dirty="0"/>
           </a:p>
@@ -10995,7 +10995,7 @@
           <a:p>
             <a:fld id="{55C13C92-F12E-A645-9195-72D828A1E4CC}" type="datetime1">
               <a:rPr lang="en-US" smtClean="0"/>
-              <a:t>7/16/16</a:t>
+              <a:t>7/17/16</a:t>
             </a:fld>
             <a:endParaRPr lang="en-US" dirty="0"/>
           </a:p>
@@ -11185,7 +11185,7 @@
           <a:p>
             <a:fld id="{9ABECC1E-BB2D-8640-BFAA-F2649732F171}" type="datetime1">
               <a:rPr lang="en-US" smtClean="0"/>
-              <a:t>7/16/16</a:t>
+              <a:t>7/17/16</a:t>
             </a:fld>
             <a:endParaRPr lang="en-US" dirty="0"/>
           </a:p>
@@ -11385,7 +11385,7 @@
           <a:p>
             <a:fld id="{1F68B04B-D1A6-6E47-8FFF-8EA857FCC20A}" type="datetime1">
               <a:rPr lang="en-US" smtClean="0"/>
-              <a:t>7/16/16</a:t>
+              <a:t>7/17/16</a:t>
             </a:fld>
             <a:endParaRPr lang="en-US" dirty="0"/>
           </a:p>
@@ -12029,7 +12029,7 @@
           <a:p>
             <a:fld id="{1E48077B-6B03-7F42-9161-87D0FE7973F8}" type="datetime1">
               <a:rPr lang="en-US" smtClean="0"/>
-              <a:t>7/16/16</a:t>
+              <a:t>7/17/16</a:t>
             </a:fld>
             <a:endParaRPr lang="en-US"/>
           </a:p>
@@ -12151,7 +12151,7 @@
           <a:p>
             <a:fld id="{0136884D-1469-1E46-9263-BB8D1ACB4A64}" type="datetime1">
               <a:rPr lang="en-US" smtClean="0"/>
-              <a:t>7/16/16</a:t>
+              <a:t>7/17/16</a:t>
             </a:fld>
             <a:endParaRPr lang="en-US"/>
           </a:p>
@@ -12250,7 +12250,7 @@
           <a:p>
             <a:fld id="{27CC7E83-50E1-1045-83FA-0FAB594D1BD4}" type="datetime1">
               <a:rPr lang="en-US" smtClean="0"/>
-              <a:t>7/16/16</a:t>
+              <a:t>7/17/16</a:t>
             </a:fld>
             <a:endParaRPr lang="en-US"/>
           </a:p>
@@ -12531,7 +12531,7 @@
           <a:p>
             <a:fld id="{9C2E28BB-0C81-5F41-96D6-475C0F33378C}" type="datetime1">
               <a:rPr lang="en-US" smtClean="0"/>
-              <a:t>7/16/16</a:t>
+              <a:t>7/17/16</a:t>
             </a:fld>
             <a:endParaRPr lang="en-US"/>
           </a:p>
@@ -12793,7 +12793,7 @@
           <a:p>
             <a:fld id="{5A53C08C-A000-C24C-B0D4-14F9DA784B8F}" type="datetime1">
               <a:rPr lang="en-US" smtClean="0"/>
-              <a:t>7/16/16</a:t>
+              <a:t>7/17/16</a:t>
             </a:fld>
             <a:endParaRPr lang="en-US"/>
           </a:p>
@@ -13010,7 +13010,7 @@
           <a:p>
             <a:fld id="{12340213-C7C4-C342-8E00-73B99A2E5FF4}" type="datetime1">
               <a:rPr lang="en-US" smtClean="0"/>
-              <a:t>7/16/16</a:t>
+              <a:t>7/17/16</a:t>
             </a:fld>
             <a:endParaRPr lang="en-US"/>
           </a:p>
@@ -13525,7 +13525,7 @@
           <a:p>
             <a:fld id="{DA977EA7-3A8C-C341-8841-47FEC12237B0}" type="datetime1">
               <a:rPr lang="en-US" smtClean="0"/>
-              <a:t>7/16/16</a:t>
+              <a:t>7/17/16</a:t>
             </a:fld>
             <a:endParaRPr lang="en-US"/>
           </a:p>
@@ -14040,7 +14040,7 @@
           <a:p>
             <a:fld id="{C74D0869-9881-ED44-A01F-63192205CAAE}" type="datetime1">
               <a:rPr lang="en-US" smtClean="0"/>
-              <a:t>7/16/16</a:t>
+              <a:t>7/17/16</a:t>
             </a:fld>
             <a:endParaRPr lang="en-US"/>
           </a:p>
@@ -14685,7 +14685,7 @@
           <a:p>
             <a:fld id="{6FE751DF-67BA-6F4C-8258-CF63A9C81540}" type="datetime1">
               <a:rPr lang="en-US" smtClean="0"/>
-              <a:t>7/16/16</a:t>
+              <a:t>7/17/16</a:t>
             </a:fld>
             <a:endParaRPr lang="en-US"/>
           </a:p>
@@ -15130,14 +15130,15 @@
         </p:nvSpPr>
         <p:spPr>
           <a:xfrm>
-            <a:off x="584200" y="546100"/>
-            <a:ext cx="7543800" cy="2593975"/>
+            <a:off x="685800" y="546100"/>
+            <a:ext cx="7955280" cy="2593975"/>
           </a:xfrm>
         </p:spPr>
         <p:txBody>
           <a:bodyPr/>
           <a:lstStyle/>
           <a:p>
+            <a:pPr algn="ctr"/>
             <a:r>
               <a:rPr lang="en-US" dirty="0" smtClean="0"/>
               <a:t>What is this </a:t>
@@ -15176,7 +15177,7 @@
       </p:sp>
       <p:sp>
         <p:nvSpPr>
-          <p:cNvPr id="16" name="Subtitle 2"/>
+          <p:cNvPr id="7" name="Subtitle 2"/>
           <p:cNvSpPr>
             <a:spLocks noGrp="1"/>
           </p:cNvSpPr>
@@ -15186,36 +15187,31 @@
         </p:nvSpPr>
         <p:spPr>
           <a:xfrm>
-            <a:off x="685800" y="3581400"/>
-            <a:ext cx="7645400" cy="2686050"/>
+            <a:off x="685800" y="3398520"/>
+            <a:ext cx="7955280" cy="2803616"/>
           </a:xfrm>
         </p:spPr>
         <p:txBody>
           <a:bodyPr>
-            <a:normAutofit fontScale="92500" lnSpcReduction="20000"/>
+            <a:normAutofit fontScale="85000" lnSpcReduction="10000"/>
           </a:bodyPr>
           <a:lstStyle/>
           <a:p>
-            <a:r>
-              <a:rPr lang="en-US" smtClean="0"/>
-              <a:t>Shelley Knuth, Research Computing, University of Colorado-Boulder</a:t>
-            </a:r>
+            <a:pPr algn="ctr"/>
             <a:r>
               <a:rPr lang="en-US" dirty="0" smtClean="0"/>
-              <a:t>		</a:t>
-            </a:r>
-          </a:p>
-          <a:p>
+              <a:t>Shelley Knuth</a:t>
+            </a:r>
+          </a:p>
+          <a:p>
+            <a:pPr algn="ctr"/>
             <a:r>
               <a:rPr lang="en-US" dirty="0" smtClean="0">
                 <a:hlinkClick r:id="rId3"/>
               </a:rPr>
               <a:t>shelley.knuth@colorado.edu</a:t>
             </a:r>
-            <a:r>
-              <a:rPr lang="en-US" dirty="0" smtClean="0"/>
-              <a:t>	</a:t>
-            </a:r>
+            <a:endParaRPr lang="en-US" dirty="0" smtClean="0"/>
           </a:p>
           <a:p>
             <a:endParaRPr lang="en-US" dirty="0" smtClean="0">
@@ -15223,6 +15219,17 @@
             </a:endParaRPr>
           </a:p>
           <a:p>
+            <a:pPr algn="ctr"/>
+            <a:r>
+              <a:rPr lang="en-US" dirty="0" smtClean="0">
+                <a:hlinkClick r:id="rId5"/>
+              </a:rPr>
+              <a:t>www.rc.colorado.edu</a:t>
+            </a:r>
+            <a:r>
+              <a:rPr lang="en-US" dirty="0" smtClean="0"/>
+              <a:t>	</a:t>
+            </a:r>
             <a:r>
               <a:rPr lang="en-US" dirty="0" smtClean="0">
                 <a:solidFill>
@@ -15237,7 +15244,7 @@
                   <a:schemeClr val="tx1"/>
                 </a:solidFill>
               </a:rPr>
-              <a:t>RC_Meetups</a:t>
+              <a:t>RC_BasicSC</a:t>
             </a:r>
             <a:endParaRPr lang="en-US" dirty="0" smtClean="0">
               <a:solidFill>
@@ -15246,9 +15253,11 @@
             </a:endParaRPr>
           </a:p>
           <a:p>
+            <a:pPr algn="ctr"/>
             <a:endParaRPr lang="en-US" dirty="0"/>
           </a:p>
           <a:p>
+            <a:pPr algn="ctr"/>
             <a:r>
               <a:rPr lang="en-US" dirty="0" smtClean="0">
                 <a:solidFill>
@@ -15271,32 +15280,42 @@
             </a:r>
             <a:r>
               <a:rPr lang="en-US" dirty="0">
-                <a:hlinkClick r:id="rId5"/>
+                <a:hlinkClick r:id="rId6"/>
               </a:rPr>
               <a:t>http://</a:t>
             </a:r>
             <a:r>
               <a:rPr lang="en-US" dirty="0" smtClean="0">
-                <a:hlinkClick r:id="rId5"/>
+                <a:hlinkClick r:id="rId6"/>
               </a:rPr>
-              <a:t>goo.gl/forms/8VidcwOhRT</a:t>
+              <a:t>tinyurl.com/rcpresurvey</a:t>
             </a:r>
             <a:r>
               <a:rPr lang="en-US" dirty="0" smtClean="0"/>
-              <a:t> </a:t>
-            </a:r>
-          </a:p>
-          <a:p>
-            <a:endParaRPr lang="en-US" dirty="0"/>
-          </a:p>
-          <a:p>
+              <a:t>  </a:t>
+            </a:r>
+          </a:p>
+          <a:p>
+            <a:pPr algn="ctr"/>
+            <a:endParaRPr lang="en-US" dirty="0" smtClean="0"/>
+          </a:p>
+          <a:p>
+            <a:pPr algn="ctr"/>
+            <a:r>
+              <a:rPr lang="en-US" dirty="0" smtClean="0">
+                <a:solidFill>
+                  <a:schemeClr val="tx1"/>
+                </a:solidFill>
+              </a:rPr>
+              <a:t>Slides</a:t>
+            </a:r>
             <a:r>
               <a:rPr lang="en-US" dirty="0">
                 <a:solidFill>
                   <a:schemeClr val="tx1"/>
                 </a:solidFill>
               </a:rPr>
-              <a:t>Slides:</a:t>
+              <a:t>:</a:t>
             </a:r>
             <a:r>
               <a:rPr lang="en-US" dirty="0"/>
@@ -15304,22 +15323,20 @@
             </a:r>
             <a:r>
               <a:rPr lang="en-US" dirty="0">
-                <a:hlinkClick r:id="rId6"/>
+                <a:hlinkClick r:id="rId7"/>
               </a:rPr>
               <a:t>https://</a:t>
             </a:r>
             <a:r>
               <a:rPr lang="en-US" dirty="0" smtClean="0">
-                <a:hlinkClick r:id="rId6"/>
+                <a:hlinkClick r:id="rId7"/>
               </a:rPr>
-              <a:t>github.com/ResearchComputing/Final_Tutorials</a:t>
+              <a:t>github.com/ResearchComputing/Final_Tutorials/tree/master/Basics_Supercomputing</a:t>
             </a:r>
             <a:r>
               <a:rPr lang="en-US" dirty="0" smtClean="0"/>
               <a:t> </a:t>
             </a:r>
-          </a:p>
-          <a:p>
             <a:endParaRPr lang="en-US" dirty="0"/>
           </a:p>
         </p:txBody>
@@ -18550,7 +18567,7 @@
 </file>
 
 <file path=ppt/slides/slide19.xml><?xml version="1.0" encoding="utf-8"?>
-<p:sld xmlns:a="http://schemas.openxmlformats.org/drawingml/2006/main" xmlns:r="http://schemas.openxmlformats.org/officeDocument/2006/relationships" xmlns:p="http://schemas.openxmlformats.org/presentationml/2006/main" show="0">
+<p:sld xmlns:a="http://schemas.openxmlformats.org/drawingml/2006/main" xmlns:r="http://schemas.openxmlformats.org/officeDocument/2006/relationships" xmlns:p="http://schemas.openxmlformats.org/presentationml/2006/main">
   <p:cSld>
     <p:spTree>
       <p:nvGrpSpPr>
@@ -19161,6 +19178,13 @@
   <p:clrMapOvr>
     <a:masterClrMapping/>
   </p:clrMapOvr>
+  <p:timing>
+    <p:tnLst>
+      <p:par>
+        <p:cTn id="1" dur="indefinite" restart="never" nodeType="tmRoot"/>
+      </p:par>
+    </p:tnLst>
+  </p:timing>
 </p:sld>
 </file>
 
@@ -20949,15 +20973,7 @@
           <a:p>
             <a:r>
               <a:rPr lang="en-US" dirty="0" smtClean="0"/>
-              <a:t>Running </a:t>
-            </a:r>
-            <a:r>
-              <a:rPr lang="en-US" dirty="0" err="1" smtClean="0"/>
-              <a:t>Matlab</a:t>
-            </a:r>
-            <a:r>
-              <a:rPr lang="en-US" dirty="0" smtClean="0"/>
-              <a:t> in Parallel</a:t>
+              <a:t>Parallel Processing Musts</a:t>
             </a:r>
             <a:endParaRPr lang="en-US" dirty="0"/>
           </a:p>
@@ -20975,145 +20991,40 @@
         </p:nvSpPr>
         <p:spPr>
           <a:xfrm>
-            <a:off x="457200" y="1417638"/>
-            <a:ext cx="4050091" cy="4647883"/>
+            <a:off x="453553" y="2175471"/>
+            <a:ext cx="8338084" cy="4035285"/>
           </a:xfrm>
         </p:spPr>
         <p:txBody>
           <a:bodyPr>
-            <a:normAutofit fontScale="92500" lnSpcReduction="10000"/>
+            <a:normAutofit/>
           </a:bodyPr>
           <a:lstStyle/>
           <a:p>
             <a:r>
-              <a:rPr lang="en-US" dirty="0" smtClean="0"/>
-              <a:t>Mimics </a:t>
-            </a:r>
-            <a:r>
-              <a:rPr lang="en-US" dirty="0" err="1" smtClean="0"/>
-              <a:t>OpenMP</a:t>
-            </a:r>
-            <a:r>
-              <a:rPr lang="en-US" dirty="0" smtClean="0"/>
-              <a:t> or MPI</a:t>
+              <a:rPr lang="en-US" sz="2800" dirty="0" smtClean="0"/>
+              <a:t>Need to be able to break the problem up into parts that can work independently of each other</a:t>
+            </a:r>
+          </a:p>
+          <a:p>
+            <a:r>
+              <a:rPr lang="en-US" sz="2800" dirty="0" smtClean="0"/>
+              <a:t>Need to also be able to be worked on simultaneously</a:t>
             </a:r>
           </a:p>
           <a:p>
             <a:pPr lvl="1"/>
             <a:r>
-              <a:rPr lang="en-US" dirty="0" smtClean="0"/>
-              <a:t>Depends on toolbox you have</a:t>
-            </a:r>
-          </a:p>
-          <a:p>
-            <a:pPr lvl="1"/>
-            <a:r>
-              <a:rPr lang="en-US" dirty="0" smtClean="0"/>
-              <a:t>Easiest to get the Parallel Computing Toolbox</a:t>
-            </a:r>
-          </a:p>
-          <a:p>
-            <a:pPr lvl="1"/>
-            <a:r>
-              <a:rPr lang="en-US" dirty="0" smtClean="0"/>
-              <a:t>Mimics </a:t>
-            </a:r>
-            <a:r>
-              <a:rPr lang="en-US" dirty="0" err="1" smtClean="0"/>
-              <a:t>OpenMP</a:t>
-            </a:r>
-            <a:endParaRPr lang="en-US" dirty="0" smtClean="0"/>
-          </a:p>
-          <a:p>
-            <a:r>
-              <a:rPr lang="en-US" dirty="0" smtClean="0"/>
-              <a:t>Easy to convert code from serial to parallel</a:t>
-            </a:r>
-          </a:p>
-          <a:p>
-            <a:pPr lvl="1"/>
-            <a:r>
-              <a:rPr lang="en-US" dirty="0" err="1" smtClean="0"/>
-              <a:t>parfor</a:t>
-            </a:r>
-            <a:endParaRPr lang="en-US" dirty="0" smtClean="0"/>
-          </a:p>
-          <a:p>
-            <a:pPr lvl="1"/>
-            <a:r>
-              <a:rPr lang="en-US" dirty="0" err="1" smtClean="0"/>
-              <a:t>spmd</a:t>
-            </a:r>
-            <a:endParaRPr lang="en-US" dirty="0" smtClean="0"/>
-          </a:p>
-          <a:p>
-            <a:r>
-              <a:rPr lang="en-US" b="1" dirty="0" smtClean="0"/>
-              <a:t>Workers:</a:t>
-            </a:r>
-            <a:r>
-              <a:rPr lang="en-US" dirty="0" smtClean="0"/>
-              <a:t>  copies of the original client created to assist in computation</a:t>
-            </a:r>
-            <a:endParaRPr lang="en-US" b="1" dirty="0" smtClean="0"/>
-          </a:p>
-          <a:p>
-            <a:endParaRPr lang="en-US" dirty="0" smtClean="0"/>
-          </a:p>
-        </p:txBody>
-      </p:sp>
-      <p:pic>
-        <p:nvPicPr>
-          <p:cNvPr id="5" name="Picture 4"/>
-          <p:cNvPicPr>
-            <a:picLocks noChangeAspect="1"/>
-          </p:cNvPicPr>
-          <p:nvPr/>
-        </p:nvPicPr>
-        <p:blipFill>
-          <a:blip r:embed="rId2"/>
-          <a:stretch>
-            <a:fillRect/>
-          </a:stretch>
-        </p:blipFill>
-        <p:spPr>
-          <a:xfrm>
-            <a:off x="4640823" y="2133601"/>
-            <a:ext cx="3949700" cy="3492500"/>
-          </a:xfrm>
-          <a:prstGeom prst="rect">
-            <a:avLst/>
-          </a:prstGeom>
-        </p:spPr>
-      </p:pic>
-      <p:sp>
-        <p:nvSpPr>
-          <p:cNvPr id="6" name="Slide Number Placeholder 5"/>
-          <p:cNvSpPr>
-            <a:spLocks noGrp="1"/>
-          </p:cNvSpPr>
-          <p:nvPr>
-            <p:ph type="sldNum" sz="quarter" idx="4"/>
-          </p:nvPr>
-        </p:nvSpPr>
-        <p:spPr/>
-        <p:txBody>
-          <a:bodyPr/>
-          <a:lstStyle/>
-          <a:p>
-            <a:fld id="{249E94F7-107C-CE46-8C56-9CACFF99CD93}" type="slidenum">
-              <a:rPr lang="en-US" smtClean="0"/>
-              <a:pPr/>
-              <a:t>24</a:t>
-            </a:fld>
-            <a:endParaRPr lang="en-US" dirty="0"/>
+              <a:rPr lang="en-US" sz="2400" dirty="0" smtClean="0"/>
+              <a:t>Can’t have the results from one CPU depend on another at each time step</a:t>
+            </a:r>
           </a:p>
         </p:txBody>
       </p:sp>
     </p:spTree>
     <p:extLst>
       <p:ext uri="{BB962C8B-B14F-4D97-AF65-F5344CB8AC3E}">
-        <p14:creationId xmlns:p14="http://schemas.microsoft.com/office/powerpoint/2010/main" val="2202720639"/>
+        <p14:creationId xmlns:p14="http://schemas.microsoft.com/office/powerpoint/2010/main" val="1375568568"/>
       </p:ext>
     </p:extLst>
   </p:cSld>
@@ -21411,11 +21322,11 @@
           <a:p>
             <a:r>
               <a:rPr lang="en-US" dirty="0" smtClean="0"/>
-              <a:t>Twitter</a:t>
-            </a:r>
-            <a:r>
-              <a:rPr lang="en-US" smtClean="0"/>
-              <a:t>:  @CUBoulderRC</a:t>
+              <a:t>Twitter:  </a:t>
+            </a:r>
+            <a:r>
+              <a:rPr lang="en-US" dirty="0" err="1" smtClean="0"/>
+              <a:t>CUBoulderRC</a:t>
             </a:r>
             <a:endParaRPr lang="en-US" dirty="0" smtClean="0"/>
           </a:p>
@@ -21426,19 +21337,30 @@
             <a:r>
               <a:rPr lang="en-US" dirty="0"/>
               <a:t>Link to survey on this topic:  </a:t>
+            </a:r>
+          </a:p>
+          <a:p>
+            <a:pPr marL="114300" indent="0">
+              <a:buNone/>
+            </a:pPr>
+            <a:r>
+              <a:rPr lang="en-US" dirty="0" smtClean="0">
+                <a:hlinkClick r:id="rId3"/>
+              </a:rPr>
+              <a:t>http</a:t>
             </a:r>
             <a:r>
               <a:rPr lang="en-US" dirty="0">
                 <a:hlinkClick r:id="rId3"/>
               </a:rPr>
-              <a:t>http://</a:t>
-            </a:r>
-            <a:r>
-              <a:rPr lang="en-US" dirty="0" smtClean="0">
-                <a:hlinkClick r:id="rId3"/>
-              </a:rPr>
-              <a:t>goo.gl/forms/8VidcwOhRT</a:t>
-            </a:r>
+              <a:t>://tinyurl.com/curc-survey16</a:t>
+            </a:r>
+            <a:r>
+              <a:rPr lang="en-US" dirty="0"/>
+              <a:t>  </a:t>
+            </a:r>
+          </a:p>
+          <a:p>
             <a:endParaRPr lang="en-US" dirty="0" smtClean="0"/>
           </a:p>
           <a:p>
@@ -21459,11 +21381,11 @@
               <a:rPr lang="en-US" dirty="0" smtClean="0">
                 <a:hlinkClick r:id="rId4"/>
               </a:rPr>
-              <a:t>github.com/ResearchComputing/Final_Tutorials</a:t>
+              <a:t>github.com/ResearchComputing/Final_Tutorials/tree/master/Basics_Supercomputing</a:t>
             </a:r>
             <a:r>
               <a:rPr lang="en-US" dirty="0" smtClean="0"/>
-              <a:t> </a:t>
+              <a:t>  </a:t>
             </a:r>
             <a:endParaRPr lang="en-US" dirty="0"/>
           </a:p>
@@ -21484,9 +21406,9 @@
           <a:bodyPr/>
           <a:lstStyle/>
           <a:p>
-            <a:fld id="{3A3C349A-9684-4D4B-9B48-BAC3E768F8DE}" type="datetime1">
-              <a:rPr lang="en-US" smtClean="0"/>
-              <a:t>7/16/16</a:t>
+            <a:fld id="{7E1CAACC-F82F-BF4F-B0F1-61A165586382}" type="datetime1">
+              <a:rPr lang="en-US" smtClean="0"/>
+              <a:t>7/17/16</a:t>
             </a:fld>
             <a:endParaRPr lang="en-US" dirty="0"/>
           </a:p>
@@ -21509,7 +21431,7 @@
           <a:p>
             <a:r>
               <a:rPr lang="en-US" smtClean="0"/>
-              <a:t>How to Use a Supercomputer</a:t>
+              <a:t>Basics of Supercomputing</a:t>
             </a:r>
             <a:endParaRPr lang="en-US" dirty="0"/>
           </a:p>
@@ -21542,13 +21464,20 @@
     </p:spTree>
     <p:extLst>
       <p:ext uri="{BB962C8B-B14F-4D97-AF65-F5344CB8AC3E}">
-        <p14:creationId xmlns:p14="http://schemas.microsoft.com/office/powerpoint/2010/main" val="1103518451"/>
+        <p14:creationId xmlns:p14="http://schemas.microsoft.com/office/powerpoint/2010/main" val="1737876471"/>
       </p:ext>
     </p:extLst>
   </p:cSld>
   <p:clrMapOvr>
     <a:masterClrMapping/>
   </p:clrMapOvr>
+  <p:timing>
+    <p:tnLst>
+      <p:par>
+        <p:cTn id="1" dur="indefinite" restart="never" nodeType="tmRoot"/>
+      </p:par>
+    </p:tnLst>
+  </p:timing>
 </p:sld>
 </file>
 

</xml_diff>